<commit_message>
TextProcessor and unit test
</commit_message>
<xml_diff>
--- a/src/test/resources/text.pptx
+++ b/src/test/resources/text.pptx
@@ -3088,11 +3088,7 @@
           <a:p>
             <a:r>
               <a:rPr lang="en-US" altLang="zh-CN"/>
-              <a:t>#{ </a:t>
-            </a:r>
-            <a:r>
-              <a:rPr lang="en-US" altLang="zh-CN"/>
-              <a:t>title }</a:t>
+              <a:t>#{ #title } </a:t>
             </a:r>
             <a:endParaRPr lang="en-US" altLang="zh-CN"/>
           </a:p>
@@ -3132,7 +3128,7 @@
                 </a:solidFill>
                 <a:sym typeface="+mn-ea"/>
               </a:rPr>
-              <a:t>#{title}</a:t>
+              <a:t>#{ #title }</a:t>
             </a:r>
             <a:endParaRPr lang="en-US" altLang="zh-CN" b="1">
               <a:solidFill>

</xml_diff>